<commit_message>
added appendix and fixed presentation
</commit_message>
<xml_diff>
--- a/text/HAWK_pres.pptx
+++ b/text/HAWK_pres.pptx
@@ -9,8 +9,9 @@
     <p:sldId id="257" r:id="rId3"/>
     <p:sldId id="258" r:id="rId4"/>
     <p:sldId id="259" r:id="rId5"/>
-    <p:sldId id="260" r:id="rId6"/>
-    <p:sldId id="261" r:id="rId7"/>
+    <p:sldId id="262" r:id="rId6"/>
+    <p:sldId id="260" r:id="rId7"/>
+    <p:sldId id="261" r:id="rId8"/>
   </p:sldIdLst>
   <p:sldSz cx="9144000" cy="6858000" type="screen4x3"/>
   <p:notesSz cx="6858000" cy="9144000"/>
@@ -305,7 +306,7 @@
           <a:p>
             <a:fld id="{628EAFA9-7502-42D3-9B79-C38E938C236F}" type="datetimeFigureOut">
               <a:rPr lang="en-US" smtClean="0"/>
-              <a:t>12/19/15</a:t>
+              <a:t>12/20/15</a:t>
             </a:fld>
             <a:endParaRPr lang="en-US"/>
           </a:p>
@@ -458,6 +459,9 @@
   <p:clrMapOvr>
     <a:masterClrMapping/>
   </p:clrMapOvr>
+  <p:transition xmlns:p14="http://schemas.microsoft.com/office/powerpoint/2010/main">
+    <p:fade/>
+  </p:transition>
 </p:sldLayout>
 </file>
 
@@ -570,7 +574,7 @@
           <a:p>
             <a:fld id="{628EAFA9-7502-42D3-9B79-C38E938C236F}" type="datetimeFigureOut">
               <a:rPr lang="en-US" smtClean="0"/>
-              <a:t>12/19/15</a:t>
+              <a:t>12/20/15</a:t>
             </a:fld>
             <a:endParaRPr lang="en-US"/>
           </a:p>
@@ -623,6 +627,9 @@
   <p:clrMapOvr>
     <a:masterClrMapping/>
   </p:clrMapOvr>
+  <p:transition xmlns:p14="http://schemas.microsoft.com/office/powerpoint/2010/main">
+    <p:fade/>
+  </p:transition>
 </p:sldLayout>
 </file>
 
@@ -745,7 +752,7 @@
           <a:p>
             <a:fld id="{628EAFA9-7502-42D3-9B79-C38E938C236F}" type="datetimeFigureOut">
               <a:rPr lang="en-US" smtClean="0"/>
-              <a:t>12/19/15</a:t>
+              <a:t>12/20/15</a:t>
             </a:fld>
             <a:endParaRPr lang="en-US"/>
           </a:p>
@@ -798,6 +805,9 @@
   <p:clrMapOvr>
     <a:masterClrMapping/>
   </p:clrMapOvr>
+  <p:transition xmlns:p14="http://schemas.microsoft.com/office/powerpoint/2010/main">
+    <p:fade/>
+  </p:transition>
 </p:sldLayout>
 </file>
 
@@ -910,7 +920,7 @@
           <a:p>
             <a:fld id="{628EAFA9-7502-42D3-9B79-C38E938C236F}" type="datetimeFigureOut">
               <a:rPr lang="en-US" smtClean="0"/>
-              <a:t>12/19/15</a:t>
+              <a:t>12/20/15</a:t>
             </a:fld>
             <a:endParaRPr lang="en-US"/>
           </a:p>
@@ -963,6 +973,9 @@
   <p:clrMapOvr>
     <a:masterClrMapping/>
   </p:clrMapOvr>
+  <p:transition xmlns:p14="http://schemas.microsoft.com/office/powerpoint/2010/main">
+    <p:fade/>
+  </p:transition>
 </p:sldLayout>
 </file>
 
@@ -1159,7 +1172,7 @@
           <a:p>
             <a:fld id="{628EAFA9-7502-42D3-9B79-C38E938C236F}" type="datetimeFigureOut">
               <a:rPr lang="en-US" smtClean="0"/>
-              <a:t>12/19/15</a:t>
+              <a:t>12/20/15</a:t>
             </a:fld>
             <a:endParaRPr lang="en-US"/>
           </a:p>
@@ -1212,6 +1225,9 @@
   <p:clrMapOvr>
     <a:masterClrMapping/>
   </p:clrMapOvr>
+  <p:transition xmlns:p14="http://schemas.microsoft.com/office/powerpoint/2010/main">
+    <p:fade/>
+  </p:transition>
 </p:sldLayout>
 </file>
 
@@ -1442,7 +1458,7 @@
           <a:p>
             <a:fld id="{628EAFA9-7502-42D3-9B79-C38E938C236F}" type="datetimeFigureOut">
               <a:rPr lang="en-US" smtClean="0"/>
-              <a:t>12/19/15</a:t>
+              <a:t>12/20/15</a:t>
             </a:fld>
             <a:endParaRPr lang="en-US"/>
           </a:p>
@@ -1495,6 +1511,9 @@
   <p:clrMapOvr>
     <a:masterClrMapping/>
   </p:clrMapOvr>
+  <p:transition xmlns:p14="http://schemas.microsoft.com/office/powerpoint/2010/main">
+    <p:fade/>
+  </p:transition>
 </p:sldLayout>
 </file>
 
@@ -1881,7 +1900,7 @@
           <a:p>
             <a:fld id="{628EAFA9-7502-42D3-9B79-C38E938C236F}" type="datetimeFigureOut">
               <a:rPr lang="en-US" smtClean="0"/>
-              <a:t>12/19/15</a:t>
+              <a:t>12/20/15</a:t>
             </a:fld>
             <a:endParaRPr lang="en-US"/>
           </a:p>
@@ -1934,6 +1953,9 @@
   <p:clrMapOvr>
     <a:masterClrMapping/>
   </p:clrMapOvr>
+  <p:transition xmlns:p14="http://schemas.microsoft.com/office/powerpoint/2010/main">
+    <p:fade/>
+  </p:transition>
 </p:sldLayout>
 </file>
 
@@ -1994,7 +2016,7 @@
           <a:p>
             <a:fld id="{628EAFA9-7502-42D3-9B79-C38E938C236F}" type="datetimeFigureOut">
               <a:rPr lang="en-US" smtClean="0"/>
-              <a:t>12/19/15</a:t>
+              <a:t>12/20/15</a:t>
             </a:fld>
             <a:endParaRPr lang="en-US"/>
           </a:p>
@@ -2047,6 +2069,9 @@
   <p:clrMapOvr>
     <a:masterClrMapping/>
   </p:clrMapOvr>
+  <p:transition xmlns:p14="http://schemas.microsoft.com/office/powerpoint/2010/main">
+    <p:fade/>
+  </p:transition>
 </p:sldLayout>
 </file>
 
@@ -2084,7 +2109,7 @@
           <a:p>
             <a:fld id="{628EAFA9-7502-42D3-9B79-C38E938C236F}" type="datetimeFigureOut">
               <a:rPr lang="en-US" smtClean="0"/>
-              <a:t>12/19/15</a:t>
+              <a:t>12/20/15</a:t>
             </a:fld>
             <a:endParaRPr lang="en-US"/>
           </a:p>
@@ -2137,6 +2162,9 @@
   <p:clrMapOvr>
     <a:masterClrMapping/>
   </p:clrMapOvr>
+  <p:transition xmlns:p14="http://schemas.microsoft.com/office/powerpoint/2010/main">
+    <p:fade/>
+  </p:transition>
 </p:sldLayout>
 </file>
 
@@ -2326,7 +2354,7 @@
           <a:p>
             <a:fld id="{628EAFA9-7502-42D3-9B79-C38E938C236F}" type="datetimeFigureOut">
               <a:rPr lang="en-US" smtClean="0"/>
-              <a:t>12/19/15</a:t>
+              <a:t>12/20/15</a:t>
             </a:fld>
             <a:endParaRPr lang="en-US"/>
           </a:p>
@@ -2402,6 +2430,9 @@
   <p:clrMapOvr>
     <a:masterClrMapping/>
   </p:clrMapOvr>
+  <p:transition xmlns:p14="http://schemas.microsoft.com/office/powerpoint/2010/main">
+    <p:fade/>
+  </p:transition>
 </p:sldLayout>
 </file>
 
@@ -2620,7 +2651,7 @@
           <a:p>
             <a:fld id="{628EAFA9-7502-42D3-9B79-C38E938C236F}" type="datetimeFigureOut">
               <a:rPr lang="en-US" smtClean="0"/>
-              <a:t>12/19/15</a:t>
+              <a:t>12/20/15</a:t>
             </a:fld>
             <a:endParaRPr lang="en-US"/>
           </a:p>
@@ -2761,6 +2792,9 @@
   <p:clrMapOvr>
     <a:masterClrMapping/>
   </p:clrMapOvr>
+  <p:transition xmlns:p14="http://schemas.microsoft.com/office/powerpoint/2010/main">
+    <p:fade/>
+  </p:transition>
 </p:sldLayout>
 </file>
 
@@ -2914,7 +2948,7 @@
           <a:p>
             <a:fld id="{628EAFA9-7502-42D3-9B79-C38E938C236F}" type="datetimeFigureOut">
               <a:rPr lang="en-US" smtClean="0"/>
-              <a:t>12/19/15</a:t>
+              <a:t>12/20/15</a:t>
             </a:fld>
             <a:endParaRPr lang="en-US"/>
           </a:p>
@@ -3102,6 +3136,9 @@
     <p:sldLayoutId id="2147483721" r:id="rId10"/>
     <p:sldLayoutId id="2147483722" r:id="rId11"/>
   </p:sldLayoutIdLst>
+  <p:transition xmlns:p14="http://schemas.microsoft.com/office/powerpoint/2010/main">
+    <p:fade/>
+  </p:transition>
   <p:txStyles>
     <p:titleStyle>
       <a:lvl1pPr algn="l" defTabSz="914400" rtl="0" eaLnBrk="1" latinLnBrk="0" hangingPunct="1">
@@ -3482,6 +3519,36 @@
           </a:p>
         </p:txBody>
       </p:sp>
+      <p:pic>
+        <p:nvPicPr>
+          <p:cNvPr id="4" name="Picture 3" descr="a-red-tail-hawk,1407681.jpg"/>
+          <p:cNvPicPr>
+            <a:picLocks noChangeAspect="1"/>
+          </p:cNvPicPr>
+          <p:nvPr/>
+        </p:nvPicPr>
+        <p:blipFill>
+          <a:blip r:embed="rId2">
+            <a:extLst>
+              <a:ext uri="{28A0092B-C50C-407E-A947-70E740481C1C}">
+                <a14:useLocalDpi xmlns:a14="http://schemas.microsoft.com/office/drawing/2010/main" val="0"/>
+              </a:ext>
+            </a:extLst>
+          </a:blip>
+          <a:stretch>
+            <a:fillRect/>
+          </a:stretch>
+        </p:blipFill>
+        <p:spPr>
+          <a:xfrm>
+            <a:off x="4762500" y="2146300"/>
+            <a:ext cx="1219200" cy="1219200"/>
+          </a:xfrm>
+          <a:prstGeom prst="rect">
+            <a:avLst/>
+          </a:prstGeom>
+        </p:spPr>
+      </p:pic>
     </p:spTree>
     <p:extLst>
       <p:ext uri="{BB962C8B-B14F-4D97-AF65-F5344CB8AC3E}">
@@ -3492,6 +3559,16 @@
   <p:clrMapOvr>
     <a:masterClrMapping/>
   </p:clrMapOvr>
+  <p:transition xmlns:p14="http://schemas.microsoft.com/office/powerpoint/2010/main">
+    <p:fade/>
+  </p:transition>
+  <p:timing>
+    <p:tnLst>
+      <p:par>
+        <p:cTn xmlns:p14="http://schemas.microsoft.com/office/powerpoint/2010/main" id="1" dur="indefinite" restart="never" nodeType="tmRoot"/>
+      </p:par>
+    </p:tnLst>
+  </p:timing>
 </p:sld>
 </file>
 
@@ -3612,6 +3689,16 @@
   <p:clrMapOvr>
     <a:masterClrMapping/>
   </p:clrMapOvr>
+  <p:transition xmlns:p14="http://schemas.microsoft.com/office/powerpoint/2010/main">
+    <p:fade/>
+  </p:transition>
+  <p:timing>
+    <p:tnLst>
+      <p:par>
+        <p:cTn xmlns:p14="http://schemas.microsoft.com/office/powerpoint/2010/main" id="1" dur="indefinite" restart="never" nodeType="tmRoot"/>
+      </p:par>
+    </p:tnLst>
+  </p:timing>
 </p:sld>
 </file>
 
@@ -3801,6 +3888,16 @@
   <p:clrMapOvr>
     <a:masterClrMapping/>
   </p:clrMapOvr>
+  <p:transition xmlns:p14="http://schemas.microsoft.com/office/powerpoint/2010/main">
+    <p:fade/>
+  </p:transition>
+  <p:timing>
+    <p:tnLst>
+      <p:par>
+        <p:cTn xmlns:p14="http://schemas.microsoft.com/office/powerpoint/2010/main" id="1" dur="indefinite" restart="never" nodeType="tmRoot"/>
+      </p:par>
+    </p:tnLst>
+  </p:timing>
 </p:sld>
 </file>
 
@@ -3859,7 +3956,68 @@
           <a:bodyPr/>
           <a:lstStyle/>
           <a:p>
-            <a:endParaRPr lang="en-US"/>
+            <a:pPr marL="342900" indent="-342900">
+              <a:buFont typeface="Arial"/>
+              <a:buChar char="•"/>
+            </a:pPr>
+            <a:r>
+              <a:rPr lang="en-US" dirty="0" smtClean="0"/>
+              <a:t>Demo 1: Find all prime numbers in a document</a:t>
+            </a:r>
+          </a:p>
+          <a:p>
+            <a:pPr marL="342900" indent="-342900">
+              <a:buFont typeface="Arial"/>
+              <a:buChar char="•"/>
+            </a:pPr>
+            <a:r>
+              <a:rPr lang="en-US" dirty="0" smtClean="0"/>
+              <a:t>Demo 2: Find the average number of </a:t>
+            </a:r>
+            <a:r>
+              <a:rPr lang="en-US" dirty="0" err="1" smtClean="0"/>
+              <a:t>upvotes</a:t>
+            </a:r>
+            <a:r>
+              <a:rPr lang="en-US" dirty="0" smtClean="0"/>
+              <a:t> on the front page of </a:t>
+            </a:r>
+            <a:r>
+              <a:rPr lang="en-US" dirty="0" err="1" smtClean="0"/>
+              <a:t>Reddit</a:t>
+            </a:r>
+            <a:endParaRPr lang="en-US" dirty="0" smtClean="0"/>
+          </a:p>
+          <a:p>
+            <a:pPr marL="342900" indent="-342900">
+              <a:buFont typeface="Arial"/>
+              <a:buChar char="•"/>
+            </a:pPr>
+            <a:r>
+              <a:rPr lang="en-US" dirty="0" smtClean="0"/>
+              <a:t>Demo 3: Get the weather</a:t>
+            </a:r>
+          </a:p>
+          <a:p>
+            <a:pPr marL="342900" indent="-342900">
+              <a:buFont typeface="Arial"/>
+              <a:buChar char="•"/>
+            </a:pPr>
+            <a:r>
+              <a:rPr lang="en-US" dirty="0" smtClean="0"/>
+              <a:t>Demo 4: Line counter; 4500 total lines of code</a:t>
+            </a:r>
+          </a:p>
+          <a:p>
+            <a:pPr marL="342900" indent="-342900">
+              <a:buFont typeface="Arial"/>
+              <a:buChar char="•"/>
+            </a:pPr>
+            <a:r>
+              <a:rPr lang="en-US" dirty="0" smtClean="0"/>
+              <a:t>Demo 5:  Nasty Type Inference</a:t>
+            </a:r>
+            <a:endParaRPr lang="en-US" dirty="0"/>
           </a:p>
         </p:txBody>
       </p:sp>
@@ -3873,10 +4031,317 @@
   <p:clrMapOvr>
     <a:masterClrMapping/>
   </p:clrMapOvr>
+  <p:transition xmlns:p14="http://schemas.microsoft.com/office/powerpoint/2010/main">
+    <p:fade/>
+  </p:transition>
+  <p:timing>
+    <p:tnLst>
+      <p:par>
+        <p:cTn xmlns:p14="http://schemas.microsoft.com/office/powerpoint/2010/main" id="1" dur="indefinite" restart="never" nodeType="tmRoot"/>
+      </p:par>
+    </p:tnLst>
+  </p:timing>
 </p:sld>
 </file>
 
 <file path=ppt/slides/slide5.xml><?xml version="1.0" encoding="utf-8"?>
+<p:sld xmlns:a="http://schemas.openxmlformats.org/drawingml/2006/main" xmlns:r="http://schemas.openxmlformats.org/officeDocument/2006/relationships" xmlns:p="http://schemas.openxmlformats.org/presentationml/2006/main">
+  <p:cSld>
+    <p:spTree>
+      <p:nvGrpSpPr>
+        <p:cNvPr id="1" name=""/>
+        <p:cNvGrpSpPr/>
+        <p:nvPr/>
+      </p:nvGrpSpPr>
+      <p:grpSpPr>
+        <a:xfrm>
+          <a:off x="0" y="0"/>
+          <a:ext cx="0" cy="0"/>
+          <a:chOff x="0" y="0"/>
+          <a:chExt cx="0" cy="0"/>
+        </a:xfrm>
+      </p:grpSpPr>
+      <p:sp>
+        <p:nvSpPr>
+          <p:cNvPr id="2" name="Title 1"/>
+          <p:cNvSpPr>
+            <a:spLocks noGrp="1"/>
+          </p:cNvSpPr>
+          <p:nvPr>
+            <p:ph type="title"/>
+          </p:nvPr>
+        </p:nvSpPr>
+        <p:spPr/>
+        <p:txBody>
+          <a:bodyPr/>
+          <a:lstStyle/>
+          <a:p>
+            <a:r>
+              <a:rPr lang="en-US" dirty="0" smtClean="0"/>
+              <a:t>Demo 5</a:t>
+            </a:r>
+            <a:endParaRPr lang="en-US" dirty="0"/>
+          </a:p>
+        </p:txBody>
+      </p:sp>
+      <p:sp>
+        <p:nvSpPr>
+          <p:cNvPr id="3" name="Content Placeholder 2"/>
+          <p:cNvSpPr>
+            <a:spLocks noGrp="1"/>
+          </p:cNvSpPr>
+          <p:nvPr>
+            <p:ph idx="1"/>
+          </p:nvPr>
+        </p:nvSpPr>
+        <p:spPr>
+          <a:xfrm>
+            <a:off x="3098800" y="0"/>
+            <a:ext cx="5892800" cy="6858000"/>
+          </a:xfrm>
+        </p:spPr>
+        <p:txBody>
+          <a:bodyPr>
+            <a:normAutofit fontScale="40000" lnSpcReduction="20000"/>
+          </a:bodyPr>
+          <a:lstStyle/>
+          <a:p>
+            <a:endParaRPr lang="en-US" sz="3200" dirty="0" smtClean="0"/>
+          </a:p>
+          <a:p>
+            <a:r>
+              <a:rPr lang="en-US" sz="3200" dirty="0" smtClean="0"/>
+              <a:t>BEGIN</a:t>
+            </a:r>
+            <a:r>
+              <a:rPr lang="en-US" sz="3200" dirty="0"/>
+              <a:t>{</a:t>
+            </a:r>
+          </a:p>
+          <a:p>
+            <a:endParaRPr lang="en-US" sz="3200" dirty="0"/>
+          </a:p>
+          <a:p>
+            <a:r>
+              <a:rPr lang="en-US" sz="3200" dirty="0" smtClean="0"/>
+              <a:t>	fun </a:t>
+            </a:r>
+            <a:r>
+              <a:rPr lang="en-US" sz="3200" dirty="0" err="1"/>
+              <a:t>getSingletonTable</a:t>
+            </a:r>
+            <a:r>
+              <a:rPr lang="en-US" sz="3200" dirty="0"/>
+              <a:t>(x){</a:t>
+            </a:r>
+          </a:p>
+          <a:p>
+            <a:r>
+              <a:rPr lang="en-US" sz="3200" dirty="0"/>
+              <a:t>		return {x};</a:t>
+            </a:r>
+          </a:p>
+          <a:p>
+            <a:r>
+              <a:rPr lang="en-US" sz="3200" dirty="0"/>
+              <a:t>	}</a:t>
+            </a:r>
+          </a:p>
+          <a:p>
+            <a:r>
+              <a:rPr lang="en-US" sz="3200" dirty="0"/>
+              <a:t>	</a:t>
+            </a:r>
+          </a:p>
+          <a:p>
+            <a:r>
+              <a:rPr lang="en-US" sz="3200" dirty="0"/>
+              <a:t>	fun </a:t>
+            </a:r>
+            <a:r>
+              <a:rPr lang="en-US" sz="3200" dirty="0" err="1"/>
+              <a:t>modifyTable</a:t>
+            </a:r>
+            <a:r>
+              <a:rPr lang="en-US" sz="3200" dirty="0"/>
+              <a:t>(t){</a:t>
+            </a:r>
+          </a:p>
+          <a:p>
+            <a:r>
+              <a:rPr lang="en-US" sz="3200" dirty="0"/>
+              <a:t>		t[0] = </a:t>
+            </a:r>
+            <a:r>
+              <a:rPr lang="en-US" sz="3200" dirty="0" err="1"/>
+              <a:t>getSingletonTable</a:t>
+            </a:r>
+            <a:r>
+              <a:rPr lang="en-US" sz="3200" dirty="0"/>
+              <a:t>(42);</a:t>
+            </a:r>
+          </a:p>
+          <a:p>
+            <a:r>
+              <a:rPr lang="en-US" sz="3200" dirty="0"/>
+              <a:t>	}</a:t>
+            </a:r>
+          </a:p>
+          <a:p>
+            <a:r>
+              <a:rPr lang="en-US" sz="3200" dirty="0"/>
+              <a:t>	</a:t>
+            </a:r>
+          </a:p>
+          <a:p>
+            <a:r>
+              <a:rPr lang="en-US" sz="3200" dirty="0"/>
+              <a:t>	table = {};</a:t>
+            </a:r>
+          </a:p>
+          <a:p>
+            <a:r>
+              <a:rPr lang="en-US" sz="3200" dirty="0"/>
+              <a:t>	table[0] = {};</a:t>
+            </a:r>
+          </a:p>
+          <a:p>
+            <a:r>
+              <a:rPr lang="en-US" sz="3200" dirty="0"/>
+              <a:t>	</a:t>
+            </a:r>
+            <a:r>
+              <a:rPr lang="en-US" sz="3200" dirty="0" err="1"/>
+              <a:t>nestedTable</a:t>
+            </a:r>
+            <a:r>
+              <a:rPr lang="en-US" sz="3200" dirty="0"/>
+              <a:t> = table[0];</a:t>
+            </a:r>
+          </a:p>
+          <a:p>
+            <a:r>
+              <a:rPr lang="en-US" sz="3200" dirty="0"/>
+              <a:t>	</a:t>
+            </a:r>
+          </a:p>
+          <a:p>
+            <a:r>
+              <a:rPr lang="en-US" sz="3200" dirty="0"/>
+              <a:t>	</a:t>
+            </a:r>
+            <a:r>
+              <a:rPr lang="en-US" sz="3200" dirty="0" err="1"/>
+              <a:t>modifyTable</a:t>
+            </a:r>
+            <a:r>
+              <a:rPr lang="en-US" sz="3200" dirty="0"/>
+              <a:t>(</a:t>
+            </a:r>
+            <a:r>
+              <a:rPr lang="en-US" sz="3200" dirty="0" err="1"/>
+              <a:t>nestedTable</a:t>
+            </a:r>
+            <a:r>
+              <a:rPr lang="en-US" sz="3200" dirty="0"/>
+              <a:t>);</a:t>
+            </a:r>
+          </a:p>
+          <a:p>
+            <a:r>
+              <a:rPr lang="en-US" sz="3200" dirty="0"/>
+              <a:t>	</a:t>
+            </a:r>
+          </a:p>
+          <a:p>
+            <a:r>
+              <a:rPr lang="en-US" sz="3200" dirty="0"/>
+              <a:t>	</a:t>
+            </a:r>
+            <a:r>
+              <a:rPr lang="en-US" sz="3200" dirty="0" err="1"/>
+              <a:t>nestedNestedTable</a:t>
+            </a:r>
+            <a:r>
+              <a:rPr lang="en-US" sz="3200" dirty="0"/>
+              <a:t> = table[0][0];</a:t>
+            </a:r>
+          </a:p>
+          <a:p>
+            <a:r>
+              <a:rPr lang="en-US" sz="3200" dirty="0"/>
+              <a:t>	value = </a:t>
+            </a:r>
+            <a:r>
+              <a:rPr lang="en-US" sz="3200" dirty="0" err="1"/>
+              <a:t>nestedNestedTable</a:t>
+            </a:r>
+            <a:r>
+              <a:rPr lang="en-US" sz="3200" dirty="0"/>
+              <a:t>[0];</a:t>
+            </a:r>
+          </a:p>
+          <a:p>
+            <a:r>
+              <a:rPr lang="en-US" sz="3200" dirty="0"/>
+              <a:t>	print(value);</a:t>
+            </a:r>
+          </a:p>
+          <a:p>
+            <a:r>
+              <a:rPr lang="en-US" sz="3200" dirty="0"/>
+              <a:t>	</a:t>
+            </a:r>
+          </a:p>
+          <a:p>
+            <a:r>
+              <a:rPr lang="en-US" sz="3200" dirty="0"/>
+              <a:t>}</a:t>
+            </a:r>
+          </a:p>
+          <a:p>
+            <a:endParaRPr lang="en-US" sz="3200" dirty="0"/>
+          </a:p>
+          <a:p>
+            <a:r>
+              <a:rPr lang="en-US" sz="3200" dirty="0"/>
+              <a:t>END</a:t>
+            </a:r>
+            <a:r>
+              <a:rPr lang="en-US" sz="3200" dirty="0" smtClean="0"/>
+              <a:t>{}</a:t>
+            </a:r>
+            <a:endParaRPr lang="en-US" sz="3200" dirty="0"/>
+          </a:p>
+          <a:p>
+            <a:endParaRPr lang="en-US" dirty="0"/>
+          </a:p>
+        </p:txBody>
+      </p:sp>
+    </p:spTree>
+    <p:extLst>
+      <p:ext uri="{BB962C8B-B14F-4D97-AF65-F5344CB8AC3E}">
+        <p14:creationId xmlns:p14="http://schemas.microsoft.com/office/powerpoint/2010/main" val="1931786579"/>
+      </p:ext>
+    </p:extLst>
+  </p:cSld>
+  <p:clrMapOvr>
+    <a:masterClrMapping/>
+  </p:clrMapOvr>
+  <p:transition xmlns:p14="http://schemas.microsoft.com/office/powerpoint/2010/main">
+    <p:fade/>
+  </p:transition>
+  <p:timing>
+    <p:tnLst>
+      <p:par>
+        <p:cTn xmlns:p14="http://schemas.microsoft.com/office/powerpoint/2010/main" id="1" dur="indefinite" restart="never" nodeType="tmRoot"/>
+      </p:par>
+    </p:tnLst>
+  </p:timing>
+</p:sld>
+</file>
+
+<file path=ppt/slides/slide6.xml><?xml version="1.0" encoding="utf-8"?>
 <p:sld xmlns:a="http://schemas.openxmlformats.org/drawingml/2006/main" xmlns:r="http://schemas.openxmlformats.org/officeDocument/2006/relationships" xmlns:p="http://schemas.openxmlformats.org/presentationml/2006/main">
   <p:cSld>
     <p:spTree>
@@ -3956,10 +4421,20 @@
   <p:clrMapOvr>
     <a:masterClrMapping/>
   </p:clrMapOvr>
+  <p:transition xmlns:p14="http://schemas.microsoft.com/office/powerpoint/2010/main">
+    <p:fade/>
+  </p:transition>
+  <p:timing>
+    <p:tnLst>
+      <p:par>
+        <p:cTn xmlns:p14="http://schemas.microsoft.com/office/powerpoint/2010/main" id="1" dur="indefinite" restart="never" nodeType="tmRoot"/>
+      </p:par>
+    </p:tnLst>
+  </p:timing>
 </p:sld>
 </file>
 
-<file path=ppt/slides/slide6.xml><?xml version="1.0" encoding="utf-8"?>
+<file path=ppt/slides/slide7.xml><?xml version="1.0" encoding="utf-8"?>
 <p:sld xmlns:a="http://schemas.openxmlformats.org/drawingml/2006/main" xmlns:r="http://schemas.openxmlformats.org/officeDocument/2006/relationships" xmlns:p="http://schemas.openxmlformats.org/presentationml/2006/main">
   <p:cSld>
     <p:spTree>
@@ -4022,7 +4497,11 @@
             </a:pPr>
             <a:r>
               <a:rPr lang="en-US" sz="2800" dirty="0" smtClean="0"/>
-              <a:t>Start early!</a:t>
+              <a:t>Start </a:t>
+            </a:r>
+            <a:r>
+              <a:rPr lang="en-US" sz="2800" dirty="0" smtClean="0"/>
+              <a:t>early!</a:t>
             </a:r>
           </a:p>
           <a:p>
@@ -4047,7 +4526,31 @@
             </a:pPr>
             <a:r>
               <a:rPr lang="en-US" sz="2800" dirty="0" smtClean="0"/>
-              <a:t>Weekly group work sessions increase productivity</a:t>
+              <a:t>Weekly group work sessions increase </a:t>
+            </a:r>
+            <a:r>
+              <a:rPr lang="en-US" sz="2800" dirty="0" smtClean="0"/>
+              <a:t>productivity</a:t>
+            </a:r>
+          </a:p>
+          <a:p>
+            <a:pPr marL="457200" indent="-457200">
+              <a:buFont typeface="Arial"/>
+              <a:buChar char="•"/>
+            </a:pPr>
+            <a:r>
+              <a:rPr lang="en-US" sz="2800" dirty="0" smtClean="0"/>
+              <a:t>Don’t commit broken code</a:t>
+            </a:r>
+          </a:p>
+          <a:p>
+            <a:pPr marL="457200" indent="-457200">
+              <a:buFont typeface="Arial"/>
+              <a:buChar char="•"/>
+            </a:pPr>
+            <a:r>
+              <a:rPr lang="en-US" sz="2800" dirty="0" smtClean="0"/>
+              <a:t>Know your LRM and set reasonable goals</a:t>
             </a:r>
             <a:endParaRPr lang="en-US" sz="2800" dirty="0"/>
           </a:p>
@@ -4063,6 +4566,16 @@
   <p:clrMapOvr>
     <a:masterClrMapping/>
   </p:clrMapOvr>
+  <p:transition xmlns:p14="http://schemas.microsoft.com/office/powerpoint/2010/main">
+    <p:fade/>
+  </p:transition>
+  <p:timing>
+    <p:tnLst>
+      <p:par>
+        <p:cTn xmlns:p14="http://schemas.microsoft.com/office/powerpoint/2010/main" id="1" dur="indefinite" restart="never" nodeType="tmRoot"/>
+      </p:par>
+    </p:tnLst>
+  </p:timing>
 </p:sld>
 </file>
 

</xml_diff>